<commit_message>
preliminary changes to the slides
</commit_message>
<xml_diff>
--- a/Dplyr_workshop.pptx
+++ b/Dplyr_workshop.pptx
@@ -8,8 +8,13 @@
     <p:sldId id="256" r:id="rId2"/>
     <p:sldId id="257" r:id="rId3"/>
     <p:sldId id="258" r:id="rId4"/>
-    <p:sldId id="259" r:id="rId5"/>
-    <p:sldId id="260" r:id="rId6"/>
+    <p:sldId id="262" r:id="rId5"/>
+    <p:sldId id="263" r:id="rId6"/>
+    <p:sldId id="265" r:id="rId7"/>
+    <p:sldId id="264" r:id="rId8"/>
+    <p:sldId id="261" r:id="rId9"/>
+    <p:sldId id="259" r:id="rId10"/>
+    <p:sldId id="260" r:id="rId11"/>
   </p:sldIdLst>
   <p:sldSz cx="12192000" cy="6858000"/>
   <p:notesSz cx="6858000" cy="9144000"/>
@@ -108,7 +113,125 @@
       </a:defRPr>
     </a:lvl9pPr>
   </p:defaultTextStyle>
+  <p:extLst>
+    <p:ext uri="{EFAFB233-063F-42B5-8137-9DF3F51BA10A}">
+      <p15:sldGuideLst xmlns:p15="http://schemas.microsoft.com/office/powerpoint/2012/main"/>
+    </p:ext>
+  </p:extLst>
 </p:presentation>
+</file>
+
+<file path=ppt/revisionInfo.xml><?xml version="1.0" encoding="utf-8"?>
+<p1510:revInfo xmlns:a="http://schemas.openxmlformats.org/drawingml/2006/main" xmlns:r="http://schemas.openxmlformats.org/officeDocument/2006/relationships" xmlns:p1510="http://schemas.microsoft.com/office/powerpoint/2015/10/main">
+  <p1510:revLst>
+    <p1510:client id="{DC5F9B89-1451-438F-B0C4-A6DE5169665A}" v="1" dt="2020-11-19T16:18:01.545"/>
+  </p1510:revLst>
+</p1510:revInfo>
+</file>
+
+<file path=ppt/changesInfos/changesInfo1.xml><?xml version="1.0" encoding="utf-8"?>
+<pc:chgInfo xmlns:a="http://schemas.openxmlformats.org/drawingml/2006/main" xmlns:r="http://schemas.openxmlformats.org/officeDocument/2006/relationships" xmlns:ac="http://schemas.microsoft.com/office/drawing/2013/main/command" xmlns:pc="http://schemas.microsoft.com/office/powerpoint/2013/main/command">
+  <pc:docChgLst>
+    <pc:chgData name="Ba Linh Le" userId="5f5df1a5ac073a6d" providerId="LiveId" clId="{DC5F9B89-1451-438F-B0C4-A6DE5169665A}"/>
+    <pc:docChg chg="addSld modSld">
+      <pc:chgData name="Ba Linh Le" userId="5f5df1a5ac073a6d" providerId="LiveId" clId="{DC5F9B89-1451-438F-B0C4-A6DE5169665A}" dt="2020-11-19T16:20:38.412" v="80" actId="1076"/>
+      <pc:docMkLst>
+        <pc:docMk/>
+      </pc:docMkLst>
+      <pc:sldChg chg="modSp new mod">
+        <pc:chgData name="Ba Linh Le" userId="5f5df1a5ac073a6d" providerId="LiveId" clId="{DC5F9B89-1451-438F-B0C4-A6DE5169665A}" dt="2020-11-19T16:13:43.792" v="22" actId="20577"/>
+        <pc:sldMkLst>
+          <pc:docMk/>
+          <pc:sldMk cId="415612612" sldId="261"/>
+        </pc:sldMkLst>
+        <pc:spChg chg="mod">
+          <ac:chgData name="Ba Linh Le" userId="5f5df1a5ac073a6d" providerId="LiveId" clId="{DC5F9B89-1451-438F-B0C4-A6DE5169665A}" dt="2020-11-19T16:13:43.792" v="22" actId="20577"/>
+          <ac:spMkLst>
+            <pc:docMk/>
+            <pc:sldMk cId="415612612" sldId="261"/>
+            <ac:spMk id="2" creationId="{F17ACCB5-95D1-419F-BD4F-46D035D7F1C9}"/>
+          </ac:spMkLst>
+        </pc:spChg>
+      </pc:sldChg>
+      <pc:sldChg chg="modSp new mod">
+        <pc:chgData name="Ba Linh Le" userId="5f5df1a5ac073a6d" providerId="LiveId" clId="{DC5F9B89-1451-438F-B0C4-A6DE5169665A}" dt="2020-11-19T16:18:01.543" v="62"/>
+        <pc:sldMkLst>
+          <pc:docMk/>
+          <pc:sldMk cId="736418569" sldId="262"/>
+        </pc:sldMkLst>
+        <pc:spChg chg="mod">
+          <ac:chgData name="Ba Linh Le" userId="5f5df1a5ac073a6d" providerId="LiveId" clId="{DC5F9B89-1451-438F-B0C4-A6DE5169665A}" dt="2020-11-19T16:18:01.543" v="62"/>
+          <ac:spMkLst>
+            <pc:docMk/>
+            <pc:sldMk cId="736418569" sldId="262"/>
+            <ac:spMk id="2" creationId="{C5088DF4-9DB5-4C90-AFA3-BB7CA3539B90}"/>
+          </ac:spMkLst>
+        </pc:spChg>
+        <pc:spChg chg="mod">
+          <ac:chgData name="Ba Linh Le" userId="5f5df1a5ac073a6d" providerId="LiveId" clId="{DC5F9B89-1451-438F-B0C4-A6DE5169665A}" dt="2020-11-19T16:17:50.011" v="61" actId="403"/>
+          <ac:spMkLst>
+            <pc:docMk/>
+            <pc:sldMk cId="736418569" sldId="262"/>
+            <ac:spMk id="3" creationId="{E7DF073D-EEC2-43FA-963F-05F933A84DAD}"/>
+          </ac:spMkLst>
+        </pc:spChg>
+      </pc:sldChg>
+      <pc:sldChg chg="addSp delSp modSp new mod">
+        <pc:chgData name="Ba Linh Le" userId="5f5df1a5ac073a6d" providerId="LiveId" clId="{DC5F9B89-1451-438F-B0C4-A6DE5169665A}" dt="2020-11-19T16:18:43.700" v="67" actId="1076"/>
+        <pc:sldMkLst>
+          <pc:docMk/>
+          <pc:sldMk cId="2851789266" sldId="263"/>
+        </pc:sldMkLst>
+        <pc:spChg chg="del">
+          <ac:chgData name="Ba Linh Le" userId="5f5df1a5ac073a6d" providerId="LiveId" clId="{DC5F9B89-1451-438F-B0C4-A6DE5169665A}" dt="2020-11-19T16:18:30.681" v="64" actId="22"/>
+          <ac:spMkLst>
+            <pc:docMk/>
+            <pc:sldMk cId="2851789266" sldId="263"/>
+            <ac:spMk id="3" creationId="{72D00D33-D17D-46A4-A330-9F0B06A9074A}"/>
+          </ac:spMkLst>
+        </pc:spChg>
+        <pc:picChg chg="add mod ord">
+          <ac:chgData name="Ba Linh Le" userId="5f5df1a5ac073a6d" providerId="LiveId" clId="{DC5F9B89-1451-438F-B0C4-A6DE5169665A}" dt="2020-11-19T16:18:43.700" v="67" actId="1076"/>
+          <ac:picMkLst>
+            <pc:docMk/>
+            <pc:sldMk cId="2851789266" sldId="263"/>
+            <ac:picMk id="5" creationId="{AC5ED971-EFD6-4C7B-8BCA-B901905B4840}"/>
+          </ac:picMkLst>
+        </pc:picChg>
+      </pc:sldChg>
+      <pc:sldChg chg="addSp modSp new mod">
+        <pc:chgData name="Ba Linh Le" userId="5f5df1a5ac073a6d" providerId="LiveId" clId="{DC5F9B89-1451-438F-B0C4-A6DE5169665A}" dt="2020-11-19T16:20:06.489" v="71" actId="1076"/>
+        <pc:sldMkLst>
+          <pc:docMk/>
+          <pc:sldMk cId="28478248" sldId="264"/>
+        </pc:sldMkLst>
+        <pc:picChg chg="add mod">
+          <ac:chgData name="Ba Linh Le" userId="5f5df1a5ac073a6d" providerId="LiveId" clId="{DC5F9B89-1451-438F-B0C4-A6DE5169665A}" dt="2020-11-19T16:20:06.489" v="71" actId="1076"/>
+          <ac:picMkLst>
+            <pc:docMk/>
+            <pc:sldMk cId="28478248" sldId="264"/>
+            <ac:picMk id="5" creationId="{6206DA01-E6E4-49BC-8BB8-69777FD7C100}"/>
+          </ac:picMkLst>
+        </pc:picChg>
+      </pc:sldChg>
+      <pc:sldChg chg="addSp modSp new mod">
+        <pc:chgData name="Ba Linh Le" userId="5f5df1a5ac073a6d" providerId="LiveId" clId="{DC5F9B89-1451-438F-B0C4-A6DE5169665A}" dt="2020-11-19T16:20:38.412" v="80" actId="1076"/>
+        <pc:sldMkLst>
+          <pc:docMk/>
+          <pc:sldMk cId="1746627316" sldId="265"/>
+        </pc:sldMkLst>
+        <pc:picChg chg="add mod">
+          <ac:chgData name="Ba Linh Le" userId="5f5df1a5ac073a6d" providerId="LiveId" clId="{DC5F9B89-1451-438F-B0C4-A6DE5169665A}" dt="2020-11-19T16:20:38.412" v="80" actId="1076"/>
+          <ac:picMkLst>
+            <pc:docMk/>
+            <pc:sldMk cId="1746627316" sldId="265"/>
+            <ac:picMk id="5" creationId="{836977C8-C659-47F5-AAF9-79B5195AD38A}"/>
+          </ac:picMkLst>
+        </pc:picChg>
+      </pc:sldChg>
+    </pc:docChg>
+  </pc:docChgLst>
+</pc:chgInfo>
 </file>
 
 <file path=ppt/slideLayouts/slideLayout1.xml><?xml version="1.0" encoding="utf-8"?>
@@ -260,7 +383,7 @@
           <a:p>
             <a:fld id="{77B3367C-B67F-4FDF-825C-D51511A83FF6}" type="datetimeFigureOut">
               <a:rPr lang="en-US" smtClean="0"/>
-              <a:t>11/13/2020</a:t>
+              <a:t>11/19/2020</a:t>
             </a:fld>
             <a:endParaRPr lang="en-US"/>
           </a:p>
@@ -460,7 +583,7 @@
           <a:p>
             <a:fld id="{77B3367C-B67F-4FDF-825C-D51511A83FF6}" type="datetimeFigureOut">
               <a:rPr lang="en-US" smtClean="0"/>
-              <a:t>11/13/2020</a:t>
+              <a:t>11/19/2020</a:t>
             </a:fld>
             <a:endParaRPr lang="en-US"/>
           </a:p>
@@ -670,7 +793,7 @@
           <a:p>
             <a:fld id="{77B3367C-B67F-4FDF-825C-D51511A83FF6}" type="datetimeFigureOut">
               <a:rPr lang="en-US" smtClean="0"/>
-              <a:t>11/13/2020</a:t>
+              <a:t>11/19/2020</a:t>
             </a:fld>
             <a:endParaRPr lang="en-US"/>
           </a:p>
@@ -870,7 +993,7 @@
           <a:p>
             <a:fld id="{77B3367C-B67F-4FDF-825C-D51511A83FF6}" type="datetimeFigureOut">
               <a:rPr lang="en-US" smtClean="0"/>
-              <a:t>11/13/2020</a:t>
+              <a:t>11/19/2020</a:t>
             </a:fld>
             <a:endParaRPr lang="en-US"/>
           </a:p>
@@ -1146,7 +1269,7 @@
           <a:p>
             <a:fld id="{77B3367C-B67F-4FDF-825C-D51511A83FF6}" type="datetimeFigureOut">
               <a:rPr lang="en-US" smtClean="0"/>
-              <a:t>11/13/2020</a:t>
+              <a:t>11/19/2020</a:t>
             </a:fld>
             <a:endParaRPr lang="en-US"/>
           </a:p>
@@ -1414,7 +1537,7 @@
           <a:p>
             <a:fld id="{77B3367C-B67F-4FDF-825C-D51511A83FF6}" type="datetimeFigureOut">
               <a:rPr lang="en-US" smtClean="0"/>
-              <a:t>11/13/2020</a:t>
+              <a:t>11/19/2020</a:t>
             </a:fld>
             <a:endParaRPr lang="en-US"/>
           </a:p>
@@ -1829,7 +1952,7 @@
           <a:p>
             <a:fld id="{77B3367C-B67F-4FDF-825C-D51511A83FF6}" type="datetimeFigureOut">
               <a:rPr lang="en-US" smtClean="0"/>
-              <a:t>11/13/2020</a:t>
+              <a:t>11/19/2020</a:t>
             </a:fld>
             <a:endParaRPr lang="en-US"/>
           </a:p>
@@ -1971,7 +2094,7 @@
           <a:p>
             <a:fld id="{77B3367C-B67F-4FDF-825C-D51511A83FF6}" type="datetimeFigureOut">
               <a:rPr lang="en-US" smtClean="0"/>
-              <a:t>11/13/2020</a:t>
+              <a:t>11/19/2020</a:t>
             </a:fld>
             <a:endParaRPr lang="en-US"/>
           </a:p>
@@ -2084,7 +2207,7 @@
           <a:p>
             <a:fld id="{77B3367C-B67F-4FDF-825C-D51511A83FF6}" type="datetimeFigureOut">
               <a:rPr lang="en-US" smtClean="0"/>
-              <a:t>11/13/2020</a:t>
+              <a:t>11/19/2020</a:t>
             </a:fld>
             <a:endParaRPr lang="en-US"/>
           </a:p>
@@ -2397,7 +2520,7 @@
           <a:p>
             <a:fld id="{77B3367C-B67F-4FDF-825C-D51511A83FF6}" type="datetimeFigureOut">
               <a:rPr lang="en-US" smtClean="0"/>
-              <a:t>11/13/2020</a:t>
+              <a:t>11/19/2020</a:t>
             </a:fld>
             <a:endParaRPr lang="en-US"/>
           </a:p>
@@ -2686,7 +2809,7 @@
           <a:p>
             <a:fld id="{77B3367C-B67F-4FDF-825C-D51511A83FF6}" type="datetimeFigureOut">
               <a:rPr lang="en-US" smtClean="0"/>
-              <a:t>11/13/2020</a:t>
+              <a:t>11/19/2020</a:t>
             </a:fld>
             <a:endParaRPr lang="en-US"/>
           </a:p>
@@ -2929,7 +3052,7 @@
           <a:p>
             <a:fld id="{77B3367C-B67F-4FDF-825C-D51511A83FF6}" type="datetimeFigureOut">
               <a:rPr lang="en-US" smtClean="0"/>
-              <a:t>11/13/2020</a:t>
+              <a:t>11/19/2020</a:t>
             </a:fld>
             <a:endParaRPr lang="en-US"/>
           </a:p>
@@ -3413,6 +3536,180 @@
 </p:sld>
 </file>
 
+<file path=ppt/slides/slide10.xml><?xml version="1.0" encoding="utf-8"?>
+<p:sld xmlns:a="http://schemas.openxmlformats.org/drawingml/2006/main" xmlns:r="http://schemas.openxmlformats.org/officeDocument/2006/relationships" xmlns:p="http://schemas.openxmlformats.org/presentationml/2006/main">
+  <p:cSld>
+    <p:spTree>
+      <p:nvGrpSpPr>
+        <p:cNvPr id="1" name=""/>
+        <p:cNvGrpSpPr/>
+        <p:nvPr/>
+      </p:nvGrpSpPr>
+      <p:grpSpPr>
+        <a:xfrm>
+          <a:off x="0" y="0"/>
+          <a:ext cx="0" cy="0"/>
+          <a:chOff x="0" y="0"/>
+          <a:chExt cx="0" cy="0"/>
+        </a:xfrm>
+      </p:grpSpPr>
+      <p:sp>
+        <p:nvSpPr>
+          <p:cNvPr id="2" name="Titel 1">
+            <a:extLst>
+              <a:ext uri="{FF2B5EF4-FFF2-40B4-BE49-F238E27FC236}">
+                <a16:creationId xmlns:a16="http://schemas.microsoft.com/office/drawing/2014/main" id="{0BCAF665-0232-485E-90AA-75ADE87FC4D1}"/>
+              </a:ext>
+            </a:extLst>
+          </p:cNvPr>
+          <p:cNvSpPr>
+            <a:spLocks noGrp="1"/>
+          </p:cNvSpPr>
+          <p:nvPr>
+            <p:ph type="title"/>
+          </p:nvPr>
+        </p:nvSpPr>
+        <p:spPr/>
+        <p:txBody>
+          <a:bodyPr/>
+          <a:lstStyle/>
+          <a:p>
+            <a:r>
+              <a:rPr lang="de-DE" dirty="0"/>
+              <a:t>Sources</a:t>
+            </a:r>
+            <a:endParaRPr lang="en-US" dirty="0"/>
+          </a:p>
+        </p:txBody>
+      </p:sp>
+      <p:sp>
+        <p:nvSpPr>
+          <p:cNvPr id="3" name="Inhaltsplatzhalter 2">
+            <a:extLst>
+              <a:ext uri="{FF2B5EF4-FFF2-40B4-BE49-F238E27FC236}">
+                <a16:creationId xmlns:a16="http://schemas.microsoft.com/office/drawing/2014/main" id="{0CF36711-1755-4744-97D0-4B088B1A5802}"/>
+              </a:ext>
+            </a:extLst>
+          </p:cNvPr>
+          <p:cNvSpPr>
+            <a:spLocks noGrp="1"/>
+          </p:cNvSpPr>
+          <p:nvPr>
+            <p:ph idx="1"/>
+          </p:nvPr>
+        </p:nvSpPr>
+        <p:spPr/>
+        <p:txBody>
+          <a:bodyPr/>
+          <a:lstStyle/>
+          <a:p>
+            <a:r>
+              <a:rPr lang="de-DE" dirty="0" err="1"/>
+              <a:t>Introduction</a:t>
+            </a:r>
+            <a:r>
+              <a:rPr lang="de-DE" dirty="0"/>
+              <a:t> </a:t>
+            </a:r>
+            <a:r>
+              <a:rPr lang="de-DE" dirty="0" err="1"/>
+              <a:t>to</a:t>
+            </a:r>
+            <a:r>
+              <a:rPr lang="de-DE" dirty="0"/>
+              <a:t> </a:t>
+            </a:r>
+            <a:r>
+              <a:rPr lang="de-DE" dirty="0" err="1"/>
+              <a:t>dplyr</a:t>
+            </a:r>
+            <a:r>
+              <a:rPr lang="de-DE" dirty="0"/>
+              <a:t>: </a:t>
+            </a:r>
+            <a:r>
+              <a:rPr lang="de-DE" dirty="0">
+                <a:hlinkClick r:id="rId2"/>
+              </a:rPr>
+              <a:t>https://cran.r-project.org/web/packages/dplyr/vignettes/dplyr.html</a:t>
+            </a:r>
+            <a:endParaRPr lang="de-DE" dirty="0"/>
+          </a:p>
+          <a:p>
+            <a:r>
+              <a:rPr lang="de-DE" dirty="0"/>
+              <a:t>Data </a:t>
+            </a:r>
+            <a:r>
+              <a:rPr lang="de-DE" dirty="0" err="1"/>
+              <a:t>transformation</a:t>
+            </a:r>
+            <a:r>
+              <a:rPr lang="de-DE"/>
+              <a:t>: </a:t>
+            </a:r>
+            <a:r>
+              <a:rPr lang="de-DE">
+                <a:hlinkClick r:id="rId3"/>
+              </a:rPr>
+              <a:t>https://r4ds.had.co.nz/transform.html</a:t>
+            </a:r>
+            <a:r>
+              <a:rPr lang="de-DE"/>
+              <a:t> </a:t>
+            </a:r>
+            <a:endParaRPr lang="de-DE" dirty="0"/>
+          </a:p>
+          <a:p>
+            <a:r>
+              <a:rPr lang="de-DE" dirty="0"/>
+              <a:t>Data </a:t>
+            </a:r>
+            <a:r>
+              <a:rPr lang="de-DE" dirty="0" err="1"/>
+              <a:t>Wrangling</a:t>
+            </a:r>
+            <a:r>
+              <a:rPr lang="de-DE" dirty="0"/>
+              <a:t> </a:t>
+            </a:r>
+            <a:r>
+              <a:rPr lang="de-DE" dirty="0" err="1"/>
+              <a:t>with</a:t>
+            </a:r>
+            <a:r>
+              <a:rPr lang="de-DE" dirty="0"/>
+              <a:t> R: </a:t>
+            </a:r>
+            <a:r>
+              <a:rPr lang="de-DE" dirty="0">
+                <a:hlinkClick r:id="rId4"/>
+              </a:rPr>
+              <a:t>https://cengel.github.io/R-data-wrangling/</a:t>
+            </a:r>
+            <a:r>
+              <a:rPr lang="de-DE" dirty="0"/>
+              <a:t> </a:t>
+            </a:r>
+          </a:p>
+          <a:p>
+            <a:endParaRPr lang="en-US" dirty="0"/>
+          </a:p>
+        </p:txBody>
+      </p:sp>
+    </p:spTree>
+    <p:extLst>
+      <p:ext uri="{BB962C8B-B14F-4D97-AF65-F5344CB8AC3E}">
+        <p14:creationId xmlns:p14="http://schemas.microsoft.com/office/powerpoint/2010/main" val="61576225"/>
+      </p:ext>
+    </p:extLst>
+  </p:cSld>
+  <p:clrMapOvr>
+    <a:masterClrMapping/>
+  </p:clrMapOvr>
+</p:sld>
+</file>
+
 <file path=ppt/slides/slide2.xml><?xml version="1.0" encoding="utf-8"?>
 <p:sld xmlns:a="http://schemas.openxmlformats.org/drawingml/2006/main" xmlns:r="http://schemas.openxmlformats.org/officeDocument/2006/relationships" xmlns:p="http://schemas.openxmlformats.org/presentationml/2006/main">
   <p:cSld>
@@ -4105,7 +4402,7 @@
           <p:cNvPr id="2" name="Titel 1">
             <a:extLst>
               <a:ext uri="{FF2B5EF4-FFF2-40B4-BE49-F238E27FC236}">
-                <a16:creationId xmlns:a16="http://schemas.microsoft.com/office/drawing/2014/main" id="{0EEF36C2-6639-467A-9281-AA8FD5AAC4C3}"/>
+                <a16:creationId xmlns:a16="http://schemas.microsoft.com/office/drawing/2014/main" id="{C5088DF4-9DB5-4C90-AFA3-BB7CA3539B90}"/>
               </a:ext>
             </a:extLst>
           </p:cNvPr>
@@ -4123,15 +4420,7 @@
           <a:p>
             <a:r>
               <a:rPr lang="de-DE" dirty="0"/>
-              <a:t>Pipe </a:t>
-            </a:r>
-            <a:r>
-              <a:rPr lang="de-DE" dirty="0" err="1"/>
-              <a:t>operator</a:t>
-            </a:r>
-            <a:r>
-              <a:rPr lang="de-DE" dirty="0"/>
-              <a:t> %&gt;%</a:t>
+              <a:t>WHAT IS TIDY DATA?</a:t>
             </a:r>
             <a:endParaRPr lang="en-US" dirty="0"/>
           </a:p>
@@ -4142,7 +4431,7 @@
           <p:cNvPr id="3" name="Inhaltsplatzhalter 2">
             <a:extLst>
               <a:ext uri="{FF2B5EF4-FFF2-40B4-BE49-F238E27FC236}">
-                <a16:creationId xmlns:a16="http://schemas.microsoft.com/office/drawing/2014/main" id="{5C8CDA23-861D-4ABC-BB82-CEBC388FEEC7}"/>
+                <a16:creationId xmlns:a16="http://schemas.microsoft.com/office/drawing/2014/main" id="{E7DF073D-EEC2-43FA-963F-05F933A84DAD}"/>
               </a:ext>
             </a:extLst>
           </p:cNvPr>
@@ -4160,174 +4449,41 @@
           </a:bodyPr>
           <a:lstStyle/>
           <a:p>
-            <a:r>
-              <a:rPr lang="de-DE" sz="4000" dirty="0"/>
-              <a:t>Shortcut: </a:t>
-            </a:r>
-            <a:r>
-              <a:rPr lang="de-DE" sz="4000" dirty="0" err="1"/>
-              <a:t>ctrl</a:t>
-            </a:r>
-            <a:r>
-              <a:rPr lang="de-DE" sz="4000" dirty="0"/>
-              <a:t>/</a:t>
-            </a:r>
-            <a:r>
-              <a:rPr lang="de-DE" sz="4000" dirty="0" err="1"/>
-              <a:t>cmd</a:t>
-            </a:r>
-            <a:r>
-              <a:rPr lang="de-DE" sz="4000" dirty="0"/>
-              <a:t> + shift + m</a:t>
-            </a:r>
-          </a:p>
-          <a:p>
-            <a:r>
-              <a:rPr lang="de-DE" sz="4000" dirty="0"/>
-              <a:t>Links </a:t>
-            </a:r>
-            <a:r>
-              <a:rPr lang="de-DE" sz="4000" dirty="0" err="1"/>
-              <a:t>together</a:t>
-            </a:r>
-            <a:r>
-              <a:rPr lang="de-DE" sz="4000" dirty="0"/>
-              <a:t> a </a:t>
-            </a:r>
-            <a:r>
-              <a:rPr lang="de-DE" sz="4000" dirty="0" err="1"/>
-              <a:t>sequence</a:t>
-            </a:r>
-            <a:r>
-              <a:rPr lang="de-DE" sz="4000" dirty="0"/>
-              <a:t> </a:t>
-            </a:r>
-            <a:r>
-              <a:rPr lang="de-DE" sz="4000" dirty="0" err="1"/>
-              <a:t>of</a:t>
-            </a:r>
-            <a:r>
-              <a:rPr lang="de-DE" sz="4000" dirty="0"/>
-              <a:t> </a:t>
-            </a:r>
-            <a:r>
-              <a:rPr lang="de-DE" sz="4000" dirty="0" err="1"/>
-              <a:t>functions</a:t>
-            </a:r>
-            <a:r>
-              <a:rPr lang="de-DE" sz="4000" dirty="0"/>
-              <a:t> </a:t>
-            </a:r>
-            <a:r>
-              <a:rPr lang="de-DE" sz="4000" dirty="0" err="1"/>
-              <a:t>by</a:t>
-            </a:r>
-            <a:r>
-              <a:rPr lang="de-DE" sz="4000" dirty="0"/>
-              <a:t> </a:t>
-            </a:r>
-            <a:r>
-              <a:rPr lang="de-DE" sz="4000" dirty="0" err="1"/>
-              <a:t>taking</a:t>
-            </a:r>
-            <a:r>
-              <a:rPr lang="de-DE" sz="4000" dirty="0"/>
-              <a:t> </a:t>
-            </a:r>
-            <a:r>
-              <a:rPr lang="de-DE" sz="4000" dirty="0" err="1"/>
-              <a:t>the</a:t>
-            </a:r>
-            <a:r>
-              <a:rPr lang="de-DE" sz="4000" dirty="0"/>
-              <a:t> </a:t>
-            </a:r>
-            <a:r>
-              <a:rPr lang="de-DE" sz="4000" dirty="0" err="1"/>
-              <a:t>output</a:t>
-            </a:r>
-            <a:r>
-              <a:rPr lang="de-DE" sz="4000" dirty="0"/>
-              <a:t> </a:t>
-            </a:r>
-            <a:r>
-              <a:rPr lang="de-DE" sz="4000" dirty="0" err="1"/>
-              <a:t>of</a:t>
-            </a:r>
-            <a:r>
-              <a:rPr lang="de-DE" sz="4000" dirty="0"/>
-              <a:t> </a:t>
-            </a:r>
-            <a:r>
-              <a:rPr lang="de-DE" sz="4000" dirty="0" err="1"/>
-              <a:t>preceding</a:t>
-            </a:r>
-            <a:r>
-              <a:rPr lang="de-DE" sz="4000" dirty="0"/>
-              <a:t> </a:t>
-            </a:r>
-            <a:r>
-              <a:rPr lang="de-DE" sz="4000" dirty="0" err="1"/>
-              <a:t>functions</a:t>
-            </a:r>
-            <a:r>
-              <a:rPr lang="de-DE" sz="4000" dirty="0"/>
-              <a:t> </a:t>
-            </a:r>
-            <a:r>
-              <a:rPr lang="de-DE" sz="4000" dirty="0" err="1"/>
-              <a:t>as</a:t>
-            </a:r>
-            <a:r>
-              <a:rPr lang="de-DE" sz="4000" dirty="0"/>
-              <a:t> </a:t>
-            </a:r>
-            <a:r>
-              <a:rPr lang="de-DE" sz="4000" dirty="0" err="1"/>
-              <a:t>input</a:t>
-            </a:r>
-            <a:r>
-              <a:rPr lang="de-DE" sz="4000" dirty="0"/>
-              <a:t> </a:t>
-            </a:r>
-            <a:r>
-              <a:rPr lang="de-DE" sz="4000" dirty="0" err="1"/>
-              <a:t>for</a:t>
-            </a:r>
-            <a:r>
-              <a:rPr lang="de-DE" sz="4000" dirty="0"/>
-              <a:t> subsequent </a:t>
-            </a:r>
-            <a:r>
-              <a:rPr lang="de-DE" sz="4000" dirty="0" err="1"/>
-              <a:t>functions</a:t>
-            </a:r>
-            <a:r>
-              <a:rPr lang="de-DE" sz="4000" dirty="0"/>
-              <a:t> </a:t>
-            </a:r>
-          </a:p>
-          <a:p>
-            <a:r>
-              <a:rPr lang="de-DE" sz="4000" dirty="0" err="1"/>
-              <a:t>Increased</a:t>
-            </a:r>
-            <a:r>
-              <a:rPr lang="de-DE" sz="4000" dirty="0"/>
-              <a:t> </a:t>
-            </a:r>
-            <a:r>
-              <a:rPr lang="de-DE" sz="4000" dirty="0" err="1"/>
-              <a:t>readability</a:t>
-            </a:r>
-            <a:endParaRPr lang="de-DE" sz="4000" dirty="0"/>
+            <a:pPr marL="514350" indent="-514350">
+              <a:buFont typeface="+mj-lt"/>
+              <a:buAutoNum type="arabicPeriod"/>
+            </a:pPr>
+            <a:r>
+              <a:rPr lang="en-US" sz="4000" dirty="0"/>
+              <a:t>Each variable forms a column.</a:t>
+            </a:r>
+          </a:p>
+          <a:p>
+            <a:pPr marL="514350" indent="-514350">
+              <a:buFont typeface="+mj-lt"/>
+              <a:buAutoNum type="arabicPeriod"/>
+            </a:pPr>
+            <a:r>
+              <a:rPr lang="en-US" sz="4000" dirty="0"/>
+              <a:t>Each observation forms a row.</a:t>
+            </a:r>
+          </a:p>
+          <a:p>
+            <a:pPr marL="514350" indent="-514350">
+              <a:buFont typeface="+mj-lt"/>
+              <a:buAutoNum type="arabicPeriod"/>
+            </a:pPr>
+            <a:r>
+              <a:rPr lang="en-US" sz="4000" dirty="0"/>
+              <a:t>Each type of observational unit forms a table</a:t>
+            </a:r>
           </a:p>
         </p:txBody>
       </p:sp>
     </p:spTree>
     <p:extLst>
       <p:ext uri="{BB962C8B-B14F-4D97-AF65-F5344CB8AC3E}">
-        <p14:creationId xmlns:p14="http://schemas.microsoft.com/office/powerpoint/2010/main" val="3419742303"/>
+        <p14:creationId xmlns:p14="http://schemas.microsoft.com/office/powerpoint/2010/main" val="736418569"/>
       </p:ext>
     </p:extLst>
   </p:cSld>
@@ -4359,7 +4515,7 @@
           <p:cNvPr id="2" name="Titel 1">
             <a:extLst>
               <a:ext uri="{FF2B5EF4-FFF2-40B4-BE49-F238E27FC236}">
-                <a16:creationId xmlns:a16="http://schemas.microsoft.com/office/drawing/2014/main" id="{0BCAF665-0232-485E-90AA-75ADE87FC4D1}"/>
+                <a16:creationId xmlns:a16="http://schemas.microsoft.com/office/drawing/2014/main" id="{CCCDCD69-A381-436F-B707-C8BDB4D92E66}"/>
               </a:ext>
             </a:extLst>
           </p:cNvPr>
@@ -4375,133 +4531,609 @@
           <a:bodyPr/>
           <a:lstStyle/>
           <a:p>
-            <a:r>
-              <a:rPr lang="de-DE" dirty="0"/>
-              <a:t>Sources</a:t>
-            </a:r>
-            <a:endParaRPr lang="en-US" dirty="0"/>
-          </a:p>
-        </p:txBody>
-      </p:sp>
-      <p:sp>
-        <p:nvSpPr>
-          <p:cNvPr id="3" name="Inhaltsplatzhalter 2">
-            <a:extLst>
-              <a:ext uri="{FF2B5EF4-FFF2-40B4-BE49-F238E27FC236}">
-                <a16:creationId xmlns:a16="http://schemas.microsoft.com/office/drawing/2014/main" id="{0CF36711-1755-4744-97D0-4B088B1A5802}"/>
-              </a:ext>
-            </a:extLst>
-          </p:cNvPr>
-          <p:cNvSpPr>
-            <a:spLocks noGrp="1"/>
-          </p:cNvSpPr>
+            <a:endParaRPr lang="en-US"/>
+          </a:p>
+        </p:txBody>
+      </p:sp>
+      <p:pic>
+        <p:nvPicPr>
+          <p:cNvPr id="5" name="Inhaltsplatzhalter 4">
+            <a:extLst>
+              <a:ext uri="{FF2B5EF4-FFF2-40B4-BE49-F238E27FC236}">
+                <a16:creationId xmlns:a16="http://schemas.microsoft.com/office/drawing/2014/main" id="{AC5ED971-EFD6-4C7B-8BCA-B901905B4840}"/>
+              </a:ext>
+            </a:extLst>
+          </p:cNvPr>
+          <p:cNvPicPr>
+            <a:picLocks noGrp="1" noChangeAspect="1"/>
+          </p:cNvPicPr>
           <p:nvPr>
             <p:ph idx="1"/>
           </p:nvPr>
-        </p:nvSpPr>
-        <p:spPr/>
-        <p:txBody>
-          <a:bodyPr/>
-          <a:lstStyle/>
-          <a:p>
-            <a:r>
-              <a:rPr lang="de-DE" dirty="0" err="1"/>
-              <a:t>Introduction</a:t>
-            </a:r>
-            <a:r>
-              <a:rPr lang="de-DE" dirty="0"/>
-              <a:t> </a:t>
-            </a:r>
-            <a:r>
-              <a:rPr lang="de-DE" dirty="0" err="1"/>
-              <a:t>to</a:t>
-            </a:r>
-            <a:r>
-              <a:rPr lang="de-DE" dirty="0"/>
-              <a:t> </a:t>
-            </a:r>
-            <a:r>
-              <a:rPr lang="de-DE" dirty="0" err="1"/>
-              <a:t>dplyr</a:t>
-            </a:r>
-            <a:r>
-              <a:rPr lang="de-DE" dirty="0"/>
-              <a:t>: </a:t>
-            </a:r>
-            <a:r>
-              <a:rPr lang="de-DE" dirty="0">
-                <a:hlinkClick r:id="rId2"/>
-              </a:rPr>
-              <a:t>https://cran.r-project.org/web/packages/dplyr/vignettes/dplyr.html</a:t>
-            </a:r>
-            <a:endParaRPr lang="de-DE" dirty="0"/>
-          </a:p>
-          <a:p>
-            <a:r>
-              <a:rPr lang="de-DE" dirty="0"/>
-              <a:t>Data </a:t>
-            </a:r>
-            <a:r>
-              <a:rPr lang="de-DE" dirty="0" err="1"/>
-              <a:t>transformation</a:t>
-            </a:r>
-            <a:r>
-              <a:rPr lang="de-DE"/>
-              <a:t>: </a:t>
-            </a:r>
-            <a:r>
-              <a:rPr lang="de-DE">
-                <a:hlinkClick r:id="rId3"/>
-              </a:rPr>
-              <a:t>https://r4ds.had.co.nz/transform.html</a:t>
-            </a:r>
-            <a:r>
-              <a:rPr lang="de-DE"/>
-              <a:t> </a:t>
-            </a:r>
-            <a:endParaRPr lang="de-DE" dirty="0"/>
-          </a:p>
-          <a:p>
-            <a:r>
-              <a:rPr lang="de-DE" dirty="0"/>
-              <a:t>Data </a:t>
-            </a:r>
-            <a:r>
-              <a:rPr lang="de-DE" dirty="0" err="1"/>
-              <a:t>Wrangling</a:t>
-            </a:r>
-            <a:r>
-              <a:rPr lang="de-DE" dirty="0"/>
-              <a:t> </a:t>
-            </a:r>
-            <a:r>
-              <a:rPr lang="de-DE" dirty="0" err="1"/>
-              <a:t>with</a:t>
-            </a:r>
-            <a:r>
-              <a:rPr lang="de-DE" dirty="0"/>
-              <a:t> R: </a:t>
-            </a:r>
-            <a:r>
-              <a:rPr lang="de-DE" dirty="0">
-                <a:hlinkClick r:id="rId4"/>
-              </a:rPr>
-              <a:t>https://cengel.github.io/R-data-wrangling/</a:t>
-            </a:r>
-            <a:r>
-              <a:rPr lang="de-DE" dirty="0"/>
-              <a:t> </a:t>
-            </a:r>
-          </a:p>
-          <a:p>
-            <a:endParaRPr lang="en-US" dirty="0"/>
-          </a:p>
-        </p:txBody>
-      </p:sp>
+        </p:nvPicPr>
+        <p:blipFill>
+          <a:blip r:embed="rId2"/>
+          <a:stretch>
+            <a:fillRect/>
+          </a:stretch>
+        </p:blipFill>
+        <p:spPr>
+          <a:xfrm>
+            <a:off x="1158668" y="1862418"/>
+            <a:ext cx="9874663" cy="3133164"/>
+          </a:xfrm>
+        </p:spPr>
+      </p:pic>
     </p:spTree>
     <p:extLst>
       <p:ext uri="{BB962C8B-B14F-4D97-AF65-F5344CB8AC3E}">
-        <p14:creationId xmlns:p14="http://schemas.microsoft.com/office/powerpoint/2010/main" val="61576225"/>
+        <p14:creationId xmlns:p14="http://schemas.microsoft.com/office/powerpoint/2010/main" val="2851789266"/>
+      </p:ext>
+    </p:extLst>
+  </p:cSld>
+  <p:clrMapOvr>
+    <a:masterClrMapping/>
+  </p:clrMapOvr>
+</p:sld>
+</file>
+
+<file path=ppt/slides/slide6.xml><?xml version="1.0" encoding="utf-8"?>
+<p:sld xmlns:a="http://schemas.openxmlformats.org/drawingml/2006/main" xmlns:r="http://schemas.openxmlformats.org/officeDocument/2006/relationships" xmlns:p="http://schemas.openxmlformats.org/presentationml/2006/main">
+  <p:cSld>
+    <p:spTree>
+      <p:nvGrpSpPr>
+        <p:cNvPr id="1" name=""/>
+        <p:cNvGrpSpPr/>
+        <p:nvPr/>
+      </p:nvGrpSpPr>
+      <p:grpSpPr>
+        <a:xfrm>
+          <a:off x="0" y="0"/>
+          <a:ext cx="0" cy="0"/>
+          <a:chOff x="0" y="0"/>
+          <a:chExt cx="0" cy="0"/>
+        </a:xfrm>
+      </p:grpSpPr>
+      <p:sp>
+        <p:nvSpPr>
+          <p:cNvPr id="2" name="Titel 1">
+            <a:extLst>
+              <a:ext uri="{FF2B5EF4-FFF2-40B4-BE49-F238E27FC236}">
+                <a16:creationId xmlns:a16="http://schemas.microsoft.com/office/drawing/2014/main" id="{71BF8885-AA1F-48CE-8A7D-F54AC6224909}"/>
+              </a:ext>
+            </a:extLst>
+          </p:cNvPr>
+          <p:cNvSpPr>
+            <a:spLocks noGrp="1"/>
+          </p:cNvSpPr>
+          <p:nvPr>
+            <p:ph type="title"/>
+          </p:nvPr>
+        </p:nvSpPr>
+        <p:spPr/>
+        <p:txBody>
+          <a:bodyPr/>
+          <a:lstStyle/>
+          <a:p>
+            <a:endParaRPr lang="en-US"/>
+          </a:p>
+        </p:txBody>
+      </p:sp>
+      <p:sp>
+        <p:nvSpPr>
+          <p:cNvPr id="3" name="Inhaltsplatzhalter 2">
+            <a:extLst>
+              <a:ext uri="{FF2B5EF4-FFF2-40B4-BE49-F238E27FC236}">
+                <a16:creationId xmlns:a16="http://schemas.microsoft.com/office/drawing/2014/main" id="{4CC338F0-B102-4467-BD1E-1853B415D2D0}"/>
+              </a:ext>
+            </a:extLst>
+          </p:cNvPr>
+          <p:cNvSpPr>
+            <a:spLocks noGrp="1"/>
+          </p:cNvSpPr>
+          <p:nvPr>
+            <p:ph idx="1"/>
+          </p:nvPr>
+        </p:nvSpPr>
+        <p:spPr/>
+        <p:txBody>
+          <a:bodyPr/>
+          <a:lstStyle/>
+          <a:p>
+            <a:endParaRPr lang="en-US"/>
+          </a:p>
+        </p:txBody>
+      </p:sp>
+      <p:pic>
+        <p:nvPicPr>
+          <p:cNvPr id="5" name="Grafik 4">
+            <a:extLst>
+              <a:ext uri="{FF2B5EF4-FFF2-40B4-BE49-F238E27FC236}">
+                <a16:creationId xmlns:a16="http://schemas.microsoft.com/office/drawing/2014/main" id="{836977C8-C659-47F5-AAF9-79B5195AD38A}"/>
+              </a:ext>
+            </a:extLst>
+          </p:cNvPr>
+          <p:cNvPicPr>
+            <a:picLocks noChangeAspect="1"/>
+          </p:cNvPicPr>
+          <p:nvPr/>
+        </p:nvPicPr>
+        <p:blipFill>
+          <a:blip r:embed="rId2"/>
+          <a:stretch>
+            <a:fillRect/>
+          </a:stretch>
+        </p:blipFill>
+        <p:spPr>
+          <a:xfrm>
+            <a:off x="1281680" y="2610007"/>
+            <a:ext cx="9628640" cy="1816285"/>
+          </a:xfrm>
+          <a:prstGeom prst="rect">
+            <a:avLst/>
+          </a:prstGeom>
+        </p:spPr>
+      </p:pic>
+    </p:spTree>
+    <p:extLst>
+      <p:ext uri="{BB962C8B-B14F-4D97-AF65-F5344CB8AC3E}">
+        <p14:creationId xmlns:p14="http://schemas.microsoft.com/office/powerpoint/2010/main" val="1746627316"/>
+      </p:ext>
+    </p:extLst>
+  </p:cSld>
+  <p:clrMapOvr>
+    <a:masterClrMapping/>
+  </p:clrMapOvr>
+</p:sld>
+</file>
+
+<file path=ppt/slides/slide7.xml><?xml version="1.0" encoding="utf-8"?>
+<p:sld xmlns:a="http://schemas.openxmlformats.org/drawingml/2006/main" xmlns:r="http://schemas.openxmlformats.org/officeDocument/2006/relationships" xmlns:p="http://schemas.openxmlformats.org/presentationml/2006/main">
+  <p:cSld>
+    <p:spTree>
+      <p:nvGrpSpPr>
+        <p:cNvPr id="1" name=""/>
+        <p:cNvGrpSpPr/>
+        <p:nvPr/>
+      </p:nvGrpSpPr>
+      <p:grpSpPr>
+        <a:xfrm>
+          <a:off x="0" y="0"/>
+          <a:ext cx="0" cy="0"/>
+          <a:chOff x="0" y="0"/>
+          <a:chExt cx="0" cy="0"/>
+        </a:xfrm>
+      </p:grpSpPr>
+      <p:sp>
+        <p:nvSpPr>
+          <p:cNvPr id="2" name="Titel 1">
+            <a:extLst>
+              <a:ext uri="{FF2B5EF4-FFF2-40B4-BE49-F238E27FC236}">
+                <a16:creationId xmlns:a16="http://schemas.microsoft.com/office/drawing/2014/main" id="{31CD0DFC-F649-4993-9DB7-DF8428D6FE4C}"/>
+              </a:ext>
+            </a:extLst>
+          </p:cNvPr>
+          <p:cNvSpPr>
+            <a:spLocks noGrp="1"/>
+          </p:cNvSpPr>
+          <p:nvPr>
+            <p:ph type="title"/>
+          </p:nvPr>
+        </p:nvSpPr>
+        <p:spPr/>
+        <p:txBody>
+          <a:bodyPr/>
+          <a:lstStyle/>
+          <a:p>
+            <a:endParaRPr lang="en-US"/>
+          </a:p>
+        </p:txBody>
+      </p:sp>
+      <p:sp>
+        <p:nvSpPr>
+          <p:cNvPr id="3" name="Inhaltsplatzhalter 2">
+            <a:extLst>
+              <a:ext uri="{FF2B5EF4-FFF2-40B4-BE49-F238E27FC236}">
+                <a16:creationId xmlns:a16="http://schemas.microsoft.com/office/drawing/2014/main" id="{20A80FDF-1ADC-491B-8676-9AA0AF49D5C9}"/>
+              </a:ext>
+            </a:extLst>
+          </p:cNvPr>
+          <p:cNvSpPr>
+            <a:spLocks noGrp="1"/>
+          </p:cNvSpPr>
+          <p:nvPr>
+            <p:ph idx="1"/>
+          </p:nvPr>
+        </p:nvSpPr>
+        <p:spPr/>
+        <p:txBody>
+          <a:bodyPr/>
+          <a:lstStyle/>
+          <a:p>
+            <a:endParaRPr lang="en-US"/>
+          </a:p>
+        </p:txBody>
+      </p:sp>
+      <p:pic>
+        <p:nvPicPr>
+          <p:cNvPr id="5" name="Grafik 4">
+            <a:extLst>
+              <a:ext uri="{FF2B5EF4-FFF2-40B4-BE49-F238E27FC236}">
+                <a16:creationId xmlns:a16="http://schemas.microsoft.com/office/drawing/2014/main" id="{6206DA01-E6E4-49BC-8BB8-69777FD7C100}"/>
+              </a:ext>
+            </a:extLst>
+          </p:cNvPr>
+          <p:cNvPicPr>
+            <a:picLocks noChangeAspect="1"/>
+          </p:cNvPicPr>
+          <p:nvPr/>
+        </p:nvPicPr>
+        <p:blipFill>
+          <a:blip r:embed="rId2"/>
+          <a:stretch>
+            <a:fillRect/>
+          </a:stretch>
+        </p:blipFill>
+        <p:spPr>
+          <a:xfrm>
+            <a:off x="2200440" y="1231875"/>
+            <a:ext cx="7791120" cy="4394249"/>
+          </a:xfrm>
+          <a:prstGeom prst="rect">
+            <a:avLst/>
+          </a:prstGeom>
+        </p:spPr>
+      </p:pic>
+    </p:spTree>
+    <p:extLst>
+      <p:ext uri="{BB962C8B-B14F-4D97-AF65-F5344CB8AC3E}">
+        <p14:creationId xmlns:p14="http://schemas.microsoft.com/office/powerpoint/2010/main" val="28478248"/>
+      </p:ext>
+    </p:extLst>
+  </p:cSld>
+  <p:clrMapOvr>
+    <a:masterClrMapping/>
+  </p:clrMapOvr>
+</p:sld>
+</file>
+
+<file path=ppt/slides/slide8.xml><?xml version="1.0" encoding="utf-8"?>
+<p:sld xmlns:a="http://schemas.openxmlformats.org/drawingml/2006/main" xmlns:r="http://schemas.openxmlformats.org/officeDocument/2006/relationships" xmlns:p="http://schemas.openxmlformats.org/presentationml/2006/main">
+  <p:cSld>
+    <p:spTree>
+      <p:nvGrpSpPr>
+        <p:cNvPr id="1" name=""/>
+        <p:cNvGrpSpPr/>
+        <p:nvPr/>
+      </p:nvGrpSpPr>
+      <p:grpSpPr>
+        <a:xfrm>
+          <a:off x="0" y="0"/>
+          <a:ext cx="0" cy="0"/>
+          <a:chOff x="0" y="0"/>
+          <a:chExt cx="0" cy="0"/>
+        </a:xfrm>
+      </p:grpSpPr>
+      <p:sp>
+        <p:nvSpPr>
+          <p:cNvPr id="2" name="Titel 1">
+            <a:extLst>
+              <a:ext uri="{FF2B5EF4-FFF2-40B4-BE49-F238E27FC236}">
+                <a16:creationId xmlns:a16="http://schemas.microsoft.com/office/drawing/2014/main" id="{F17ACCB5-95D1-419F-BD4F-46D035D7F1C9}"/>
+              </a:ext>
+            </a:extLst>
+          </p:cNvPr>
+          <p:cNvSpPr>
+            <a:spLocks noGrp="1"/>
+          </p:cNvSpPr>
+          <p:nvPr>
+            <p:ph type="title"/>
+          </p:nvPr>
+        </p:nvSpPr>
+        <p:spPr/>
+        <p:txBody>
+          <a:bodyPr/>
+          <a:lstStyle/>
+          <a:p>
+            <a:r>
+              <a:rPr lang="de-DE" dirty="0"/>
+              <a:t>Split, </a:t>
+            </a:r>
+            <a:r>
+              <a:rPr lang="de-DE" dirty="0" err="1"/>
+              <a:t>Apply</a:t>
+            </a:r>
+            <a:r>
+              <a:rPr lang="de-DE" dirty="0"/>
+              <a:t>, Combine </a:t>
+            </a:r>
+            <a:endParaRPr lang="en-US" dirty="0"/>
+          </a:p>
+        </p:txBody>
+      </p:sp>
+      <p:sp>
+        <p:nvSpPr>
+          <p:cNvPr id="3" name="Inhaltsplatzhalter 2">
+            <a:extLst>
+              <a:ext uri="{FF2B5EF4-FFF2-40B4-BE49-F238E27FC236}">
+                <a16:creationId xmlns:a16="http://schemas.microsoft.com/office/drawing/2014/main" id="{1A685EBB-FA25-477C-8913-88BE979E7510}"/>
+              </a:ext>
+            </a:extLst>
+          </p:cNvPr>
+          <p:cNvSpPr>
+            <a:spLocks noGrp="1"/>
+          </p:cNvSpPr>
+          <p:nvPr>
+            <p:ph idx="1"/>
+          </p:nvPr>
+        </p:nvSpPr>
+        <p:spPr/>
+        <p:txBody>
+          <a:bodyPr/>
+          <a:lstStyle/>
+          <a:p>
+            <a:endParaRPr lang="en-US"/>
+          </a:p>
+        </p:txBody>
+      </p:sp>
+    </p:spTree>
+    <p:extLst>
+      <p:ext uri="{BB962C8B-B14F-4D97-AF65-F5344CB8AC3E}">
+        <p14:creationId xmlns:p14="http://schemas.microsoft.com/office/powerpoint/2010/main" val="415612612"/>
+      </p:ext>
+    </p:extLst>
+  </p:cSld>
+  <p:clrMapOvr>
+    <a:masterClrMapping/>
+  </p:clrMapOvr>
+</p:sld>
+</file>
+
+<file path=ppt/slides/slide9.xml><?xml version="1.0" encoding="utf-8"?>
+<p:sld xmlns:a="http://schemas.openxmlformats.org/drawingml/2006/main" xmlns:r="http://schemas.openxmlformats.org/officeDocument/2006/relationships" xmlns:p="http://schemas.openxmlformats.org/presentationml/2006/main">
+  <p:cSld>
+    <p:spTree>
+      <p:nvGrpSpPr>
+        <p:cNvPr id="1" name=""/>
+        <p:cNvGrpSpPr/>
+        <p:nvPr/>
+      </p:nvGrpSpPr>
+      <p:grpSpPr>
+        <a:xfrm>
+          <a:off x="0" y="0"/>
+          <a:ext cx="0" cy="0"/>
+          <a:chOff x="0" y="0"/>
+          <a:chExt cx="0" cy="0"/>
+        </a:xfrm>
+      </p:grpSpPr>
+      <p:sp>
+        <p:nvSpPr>
+          <p:cNvPr id="2" name="Titel 1">
+            <a:extLst>
+              <a:ext uri="{FF2B5EF4-FFF2-40B4-BE49-F238E27FC236}">
+                <a16:creationId xmlns:a16="http://schemas.microsoft.com/office/drawing/2014/main" id="{0EEF36C2-6639-467A-9281-AA8FD5AAC4C3}"/>
+              </a:ext>
+            </a:extLst>
+          </p:cNvPr>
+          <p:cNvSpPr>
+            <a:spLocks noGrp="1"/>
+          </p:cNvSpPr>
+          <p:nvPr>
+            <p:ph type="title"/>
+          </p:nvPr>
+        </p:nvSpPr>
+        <p:spPr/>
+        <p:txBody>
+          <a:bodyPr/>
+          <a:lstStyle/>
+          <a:p>
+            <a:r>
+              <a:rPr lang="de-DE" dirty="0"/>
+              <a:t>Pipe </a:t>
+            </a:r>
+            <a:r>
+              <a:rPr lang="de-DE" dirty="0" err="1"/>
+              <a:t>operator</a:t>
+            </a:r>
+            <a:r>
+              <a:rPr lang="de-DE" dirty="0"/>
+              <a:t> %&gt;%</a:t>
+            </a:r>
+            <a:endParaRPr lang="en-US" dirty="0"/>
+          </a:p>
+        </p:txBody>
+      </p:sp>
+      <p:sp>
+        <p:nvSpPr>
+          <p:cNvPr id="3" name="Inhaltsplatzhalter 2">
+            <a:extLst>
+              <a:ext uri="{FF2B5EF4-FFF2-40B4-BE49-F238E27FC236}">
+                <a16:creationId xmlns:a16="http://schemas.microsoft.com/office/drawing/2014/main" id="{5C8CDA23-861D-4ABC-BB82-CEBC388FEEC7}"/>
+              </a:ext>
+            </a:extLst>
+          </p:cNvPr>
+          <p:cNvSpPr>
+            <a:spLocks noGrp="1"/>
+          </p:cNvSpPr>
+          <p:nvPr>
+            <p:ph idx="1"/>
+          </p:nvPr>
+        </p:nvSpPr>
+        <p:spPr/>
+        <p:txBody>
+          <a:bodyPr>
+            <a:normAutofit/>
+          </a:bodyPr>
+          <a:lstStyle/>
+          <a:p>
+            <a:r>
+              <a:rPr lang="de-DE" sz="4000" dirty="0"/>
+              <a:t>Shortcut: </a:t>
+            </a:r>
+            <a:r>
+              <a:rPr lang="de-DE" sz="4000" dirty="0" err="1"/>
+              <a:t>ctrl</a:t>
+            </a:r>
+            <a:r>
+              <a:rPr lang="de-DE" sz="4000" dirty="0"/>
+              <a:t>/</a:t>
+            </a:r>
+            <a:r>
+              <a:rPr lang="de-DE" sz="4000" dirty="0" err="1"/>
+              <a:t>cmd</a:t>
+            </a:r>
+            <a:r>
+              <a:rPr lang="de-DE" sz="4000" dirty="0"/>
+              <a:t> + shift + m</a:t>
+            </a:r>
+          </a:p>
+          <a:p>
+            <a:r>
+              <a:rPr lang="de-DE" sz="4000" dirty="0"/>
+              <a:t>Links </a:t>
+            </a:r>
+            <a:r>
+              <a:rPr lang="de-DE" sz="4000" dirty="0" err="1"/>
+              <a:t>together</a:t>
+            </a:r>
+            <a:r>
+              <a:rPr lang="de-DE" sz="4000" dirty="0"/>
+              <a:t> a </a:t>
+            </a:r>
+            <a:r>
+              <a:rPr lang="de-DE" sz="4000" dirty="0" err="1"/>
+              <a:t>sequence</a:t>
+            </a:r>
+            <a:r>
+              <a:rPr lang="de-DE" sz="4000" dirty="0"/>
+              <a:t> </a:t>
+            </a:r>
+            <a:r>
+              <a:rPr lang="de-DE" sz="4000" dirty="0" err="1"/>
+              <a:t>of</a:t>
+            </a:r>
+            <a:r>
+              <a:rPr lang="de-DE" sz="4000" dirty="0"/>
+              <a:t> </a:t>
+            </a:r>
+            <a:r>
+              <a:rPr lang="de-DE" sz="4000" dirty="0" err="1"/>
+              <a:t>functions</a:t>
+            </a:r>
+            <a:r>
+              <a:rPr lang="de-DE" sz="4000" dirty="0"/>
+              <a:t> </a:t>
+            </a:r>
+            <a:r>
+              <a:rPr lang="de-DE" sz="4000" dirty="0" err="1"/>
+              <a:t>by</a:t>
+            </a:r>
+            <a:r>
+              <a:rPr lang="de-DE" sz="4000" dirty="0"/>
+              <a:t> </a:t>
+            </a:r>
+            <a:r>
+              <a:rPr lang="de-DE" sz="4000" dirty="0" err="1"/>
+              <a:t>taking</a:t>
+            </a:r>
+            <a:r>
+              <a:rPr lang="de-DE" sz="4000" dirty="0"/>
+              <a:t> </a:t>
+            </a:r>
+            <a:r>
+              <a:rPr lang="de-DE" sz="4000" dirty="0" err="1"/>
+              <a:t>the</a:t>
+            </a:r>
+            <a:r>
+              <a:rPr lang="de-DE" sz="4000" dirty="0"/>
+              <a:t> </a:t>
+            </a:r>
+            <a:r>
+              <a:rPr lang="de-DE" sz="4000" dirty="0" err="1"/>
+              <a:t>output</a:t>
+            </a:r>
+            <a:r>
+              <a:rPr lang="de-DE" sz="4000" dirty="0"/>
+              <a:t> </a:t>
+            </a:r>
+            <a:r>
+              <a:rPr lang="de-DE" sz="4000" dirty="0" err="1"/>
+              <a:t>of</a:t>
+            </a:r>
+            <a:r>
+              <a:rPr lang="de-DE" sz="4000" dirty="0"/>
+              <a:t> </a:t>
+            </a:r>
+            <a:r>
+              <a:rPr lang="de-DE" sz="4000" dirty="0" err="1"/>
+              <a:t>preceding</a:t>
+            </a:r>
+            <a:r>
+              <a:rPr lang="de-DE" sz="4000" dirty="0"/>
+              <a:t> </a:t>
+            </a:r>
+            <a:r>
+              <a:rPr lang="de-DE" sz="4000" dirty="0" err="1"/>
+              <a:t>functions</a:t>
+            </a:r>
+            <a:r>
+              <a:rPr lang="de-DE" sz="4000" dirty="0"/>
+              <a:t> </a:t>
+            </a:r>
+            <a:r>
+              <a:rPr lang="de-DE" sz="4000" dirty="0" err="1"/>
+              <a:t>as</a:t>
+            </a:r>
+            <a:r>
+              <a:rPr lang="de-DE" sz="4000" dirty="0"/>
+              <a:t> </a:t>
+            </a:r>
+            <a:r>
+              <a:rPr lang="de-DE" sz="4000" dirty="0" err="1"/>
+              <a:t>input</a:t>
+            </a:r>
+            <a:r>
+              <a:rPr lang="de-DE" sz="4000" dirty="0"/>
+              <a:t> </a:t>
+            </a:r>
+            <a:r>
+              <a:rPr lang="de-DE" sz="4000" dirty="0" err="1"/>
+              <a:t>for</a:t>
+            </a:r>
+            <a:r>
+              <a:rPr lang="de-DE" sz="4000" dirty="0"/>
+              <a:t> subsequent </a:t>
+            </a:r>
+            <a:r>
+              <a:rPr lang="de-DE" sz="4000" dirty="0" err="1"/>
+              <a:t>functions</a:t>
+            </a:r>
+            <a:r>
+              <a:rPr lang="de-DE" sz="4000" dirty="0"/>
+              <a:t> </a:t>
+            </a:r>
+          </a:p>
+          <a:p>
+            <a:r>
+              <a:rPr lang="de-DE" sz="4000" dirty="0" err="1"/>
+              <a:t>Increased</a:t>
+            </a:r>
+            <a:r>
+              <a:rPr lang="de-DE" sz="4000" dirty="0"/>
+              <a:t> </a:t>
+            </a:r>
+            <a:r>
+              <a:rPr lang="de-DE" sz="4000" dirty="0" err="1"/>
+              <a:t>readability</a:t>
+            </a:r>
+            <a:endParaRPr lang="de-DE" sz="4000" dirty="0"/>
+          </a:p>
+        </p:txBody>
+      </p:sp>
+    </p:spTree>
+    <p:extLst>
+      <p:ext uri="{BB962C8B-B14F-4D97-AF65-F5344CB8AC3E}">
+        <p14:creationId xmlns:p14="http://schemas.microsoft.com/office/powerpoint/2010/main" val="3419742303"/>
       </p:ext>
     </p:extLst>
   </p:cSld>

</xml_diff>